<commit_message>
super dense all action implemented
</commit_message>
<xml_diff>
--- a/Progress/6 Project Progress.pptx
+++ b/Progress/6 Project Progress.pptx
@@ -171,7 +171,7 @@
   <pc:docChgLst>
     <pc:chgData name="Kyriacos Kyriacou" userId="6a303e1966778a2b" providerId="LiveId" clId="{6898067F-2F79-4559-B499-DDA1E595D8B7}"/>
     <pc:docChg chg="undo redo custSel addSld delSld modSld sldOrd">
-      <pc:chgData name="Kyriacos Kyriacou" userId="6a303e1966778a2b" providerId="LiveId" clId="{6898067F-2F79-4559-B499-DDA1E595D8B7}" dt="2023-06-26T20:01:07.860" v="1448" actId="1076"/>
+      <pc:chgData name="Kyriacos Kyriacou" userId="6a303e1966778a2b" providerId="LiveId" clId="{6898067F-2F79-4559-B499-DDA1E595D8B7}" dt="2023-06-27T10:48:52.254" v="1607" actId="20577"/>
       <pc:docMkLst>
         <pc:docMk/>
       </pc:docMkLst>
@@ -227,13 +227,13 @@
         </pc:sldMkLst>
       </pc:sldChg>
       <pc:sldChg chg="modSp mod">
-        <pc:chgData name="Kyriacos Kyriacou" userId="6a303e1966778a2b" providerId="LiveId" clId="{6898067F-2F79-4559-B499-DDA1E595D8B7}" dt="2023-06-26T19:59:47.301" v="1433" actId="20577"/>
+        <pc:chgData name="Kyriacos Kyriacou" userId="6a303e1966778a2b" providerId="LiveId" clId="{6898067F-2F79-4559-B499-DDA1E595D8B7}" dt="2023-06-27T09:50:43.193" v="1602" actId="20577"/>
         <pc:sldMkLst>
           <pc:docMk/>
           <pc:sldMk cId="3264051298" sldId="264"/>
         </pc:sldMkLst>
         <pc:spChg chg="mod">
-          <ac:chgData name="Kyriacos Kyriacou" userId="6a303e1966778a2b" providerId="LiveId" clId="{6898067F-2F79-4559-B499-DDA1E595D8B7}" dt="2023-06-26T19:59:47.301" v="1433" actId="20577"/>
+          <ac:chgData name="Kyriacos Kyriacou" userId="6a303e1966778a2b" providerId="LiveId" clId="{6898067F-2F79-4559-B499-DDA1E595D8B7}" dt="2023-06-27T09:50:43.193" v="1602" actId="20577"/>
           <ac:spMkLst>
             <pc:docMk/>
             <pc:sldMk cId="3264051298" sldId="264"/>
@@ -249,13 +249,21 @@
         </pc:sldMkLst>
       </pc:sldChg>
       <pc:sldChg chg="delSp modSp mod">
-        <pc:chgData name="Kyriacos Kyriacou" userId="6a303e1966778a2b" providerId="LiveId" clId="{6898067F-2F79-4559-B499-DDA1E595D8B7}" dt="2023-06-26T19:16:51.874" v="685" actId="20577"/>
+        <pc:chgData name="Kyriacos Kyriacou" userId="6a303e1966778a2b" providerId="LiveId" clId="{6898067F-2F79-4559-B499-DDA1E595D8B7}" dt="2023-06-27T10:48:52.254" v="1607" actId="20577"/>
         <pc:sldMkLst>
           <pc:docMk/>
           <pc:sldMk cId="4165286930" sldId="266"/>
         </pc:sldMkLst>
         <pc:spChg chg="mod">
-          <ac:chgData name="Kyriacos Kyriacou" userId="6a303e1966778a2b" providerId="LiveId" clId="{6898067F-2F79-4559-B499-DDA1E595D8B7}" dt="2023-06-26T19:16:51.874" v="685" actId="20577"/>
+          <ac:chgData name="Kyriacos Kyriacou" userId="6a303e1966778a2b" providerId="LiveId" clId="{6898067F-2F79-4559-B499-DDA1E595D8B7}" dt="2023-06-27T09:50:56.903" v="1605" actId="20577"/>
+          <ac:spMkLst>
+            <pc:docMk/>
+            <pc:sldMk cId="4165286930" sldId="266"/>
+            <ac:spMk id="2" creationId="{7F43F27D-1383-DBD0-6044-32AFBFAE9F9F}"/>
+          </ac:spMkLst>
+        </pc:spChg>
+        <pc:spChg chg="mod">
+          <ac:chgData name="Kyriacos Kyriacou" userId="6a303e1966778a2b" providerId="LiveId" clId="{6898067F-2F79-4559-B499-DDA1E595D8B7}" dt="2023-06-27T10:48:52.254" v="1607" actId="20577"/>
           <ac:spMkLst>
             <pc:docMk/>
             <pc:sldMk cId="4165286930" sldId="266"/>
@@ -1735,7 +1743,7 @@
               <a:pPr>
                 <a:defRPr/>
               </a:pPr>
-              <a:t>6/26/2023</a:t>
+              <a:t>6/27/2023</a:t>
             </a:fld>
             <a:endParaRPr lang="en-US" altLang="en-US"/>
           </a:p>
@@ -1927,7 +1935,7 @@
               <a:pPr>
                 <a:defRPr/>
               </a:pPr>
-              <a:t>6/26/2023</a:t>
+              <a:t>6/27/2023</a:t>
             </a:fld>
             <a:endParaRPr lang="en-US" altLang="en-US"/>
           </a:p>
@@ -2129,7 +2137,7 @@
               <a:pPr>
                 <a:defRPr/>
               </a:pPr>
-              <a:t>6/26/2023</a:t>
+              <a:t>6/27/2023</a:t>
             </a:fld>
             <a:endParaRPr lang="en-US" altLang="en-US"/>
           </a:p>
@@ -2321,7 +2329,7 @@
               <a:pPr>
                 <a:defRPr/>
               </a:pPr>
-              <a:t>6/26/2023</a:t>
+              <a:t>6/27/2023</a:t>
             </a:fld>
             <a:endParaRPr lang="en-US" altLang="en-US"/>
           </a:p>
@@ -2589,7 +2597,7 @@
               <a:pPr>
                 <a:defRPr/>
               </a:pPr>
-              <a:t>6/26/2023</a:t>
+              <a:t>6/27/2023</a:t>
             </a:fld>
             <a:endParaRPr lang="en-US" altLang="en-US"/>
           </a:p>
@@ -2899,7 +2907,7 @@
               <a:pPr>
                 <a:defRPr/>
               </a:pPr>
-              <a:t>6/26/2023</a:t>
+              <a:t>6/27/2023</a:t>
             </a:fld>
             <a:endParaRPr lang="en-US" altLang="en-US"/>
           </a:p>
@@ -3343,7 +3351,7 @@
               <a:pPr>
                 <a:defRPr/>
               </a:pPr>
-              <a:t>6/26/2023</a:t>
+              <a:t>6/27/2023</a:t>
             </a:fld>
             <a:endParaRPr lang="en-US" altLang="en-US"/>
           </a:p>
@@ -3483,7 +3491,7 @@
               <a:pPr>
                 <a:defRPr/>
               </a:pPr>
-              <a:t>6/26/2023</a:t>
+              <a:t>6/27/2023</a:t>
             </a:fld>
             <a:endParaRPr lang="en-US" altLang="en-US"/>
           </a:p>
@@ -3600,7 +3608,7 @@
               <a:pPr>
                 <a:defRPr/>
               </a:pPr>
-              <a:t>6/26/2023</a:t>
+              <a:t>6/27/2023</a:t>
             </a:fld>
             <a:endParaRPr lang="en-US" altLang="en-US"/>
           </a:p>
@@ -3899,7 +3907,7 @@
               <a:pPr>
                 <a:defRPr/>
               </a:pPr>
-              <a:t>6/26/2023</a:t>
+              <a:t>6/27/2023</a:t>
             </a:fld>
             <a:endParaRPr lang="en-US" altLang="en-US"/>
           </a:p>
@@ -4181,7 +4189,7 @@
               <a:pPr>
                 <a:defRPr/>
               </a:pPr>
-              <a:t>6/26/2023</a:t>
+              <a:t>6/27/2023</a:t>
             </a:fld>
             <a:endParaRPr lang="en-US" altLang="en-US"/>
           </a:p>
@@ -4472,7 +4480,7 @@
               <a:pPr>
                 <a:defRPr/>
               </a:pPr>
-              <a:t>6/26/2023</a:t>
+              <a:t>6/27/2023</a:t>
             </a:fld>
             <a:endParaRPr lang="en-US" altLang="en-US"/>
           </a:p>
@@ -5142,7 +5150,7 @@
           <a:p>
             <a:r>
               <a:rPr lang="en-GB" altLang="en-US" dirty="0"/>
-              <a:t>Evaluation Metrics:</a:t>
+              <a:t>Evaluation:</a:t>
             </a:r>
             <a:endParaRPr lang="en-GB" dirty="0"/>
           </a:p>
@@ -5231,7 +5239,21 @@
                 <a:latin typeface="Söhne"/>
                 <a:sym typeface="Wingdings" panose="05000000000000000000" pitchFamily="2" charset="2"/>
               </a:rPr>
-              <a:t> Use 500 negative samples</a:t>
+              <a:t> </a:t>
+            </a:r>
+            <a:r>
+              <a:rPr lang="en-GB" sz="1600">
+                <a:latin typeface="Söhne"/>
+                <a:sym typeface="Wingdings" panose="05000000000000000000" pitchFamily="2" charset="2"/>
+              </a:rPr>
+              <a:t>Use 700 </a:t>
+            </a:r>
+            <a:r>
+              <a:rPr lang="en-GB" sz="1600" dirty="0">
+                <a:latin typeface="Söhne"/>
+                <a:sym typeface="Wingdings" panose="05000000000000000000" pitchFamily="2" charset="2"/>
+              </a:rPr>
+              <a:t>negative samples</a:t>
             </a:r>
             <a:r>
               <a:rPr lang="en-GB" sz="1600" dirty="0">
@@ -6825,14 +6847,11 @@
               <a:buChar char="•"/>
             </a:pPr>
             <a:r>
-              <a:rPr lang="en-GB" sz="2000">
-                <a:latin typeface="Söhne"/>
-              </a:rPr>
-              <a:t>Fix SAM. </a:t>
-            </a:r>
-            <a:endParaRPr lang="en-GB" sz="2000" dirty="0">
-              <a:latin typeface="Söhne"/>
-            </a:endParaRPr>
+              <a:rPr lang="en-GB" sz="2000" dirty="0">
+                <a:latin typeface="Söhne"/>
+              </a:rPr>
+              <a:t>Fix SAM (for later). </a:t>
+            </a:r>
           </a:p>
           <a:p>
             <a:pPr algn="l">
@@ -6843,7 +6862,7 @@
               <a:rPr lang="en-GB" sz="2000" dirty="0">
                 <a:latin typeface="Söhne"/>
               </a:rPr>
-              <a:t>Start thinking about temporal information.</a:t>
+              <a:t>Sampling ways in all action and dense all action. </a:t>
             </a:r>
           </a:p>
           <a:p>

</xml_diff>